<commit_message>
cube maps and checkpoint #10 added
</commit_message>
<xml_diff>
--- a/Lectures/Day_11 Texturing, part 1/INFO3111_Texture_mapping (code on last slide).pptx
+++ b/Lectures/Day_11 Texturing, part 1/INFO3111_Texture_mapping (code on last slide).pptx
@@ -228,7 +228,7 @@
             <a:fld id="{6E28E25E-87BB-46EA-8F9E-473DAE89420C}" type="datetimeFigureOut">
               <a:rPr lang="en-CA" smtClean="0"/>
               <a:pPr/>
-              <a:t>2024-06-06</a:t>
+              <a:t>2024-06-11</a:t>
             </a:fld>
             <a:endParaRPr lang="en-CA"/>
           </a:p>
@@ -394,7 +394,7 @@
           <a:p>
             <a:fld id="{D61BC0C6-8165-4029-93EB-E0CF8A3883CE}" type="datetimeFigureOut">
               <a:rPr lang="en-CA" smtClean="0"/>
-              <a:t>2024-06-06</a:t>
+              <a:t>2024-06-11</a:t>
             </a:fld>
             <a:endParaRPr lang="en-CA"/>
           </a:p>
@@ -936,7 +936,7 @@
             <a:fld id="{667A62CB-8588-4D98-8E9E-C665A03A0EA4}" type="datetimeFigureOut">
               <a:rPr lang="en-CA" smtClean="0"/>
               <a:pPr/>
-              <a:t>2024-06-06</a:t>
+              <a:t>2024-06-11</a:t>
             </a:fld>
             <a:endParaRPr lang="en-CA"/>
           </a:p>
@@ -1103,7 +1103,7 @@
             <a:fld id="{667A62CB-8588-4D98-8E9E-C665A03A0EA4}" type="datetimeFigureOut">
               <a:rPr lang="en-CA" smtClean="0"/>
               <a:pPr/>
-              <a:t>2024-06-06</a:t>
+              <a:t>2024-06-11</a:t>
             </a:fld>
             <a:endParaRPr lang="en-CA"/>
           </a:p>
@@ -1280,7 +1280,7 @@
             <a:fld id="{667A62CB-8588-4D98-8E9E-C665A03A0EA4}" type="datetimeFigureOut">
               <a:rPr lang="en-CA" smtClean="0"/>
               <a:pPr/>
-              <a:t>2024-06-06</a:t>
+              <a:t>2024-06-11</a:t>
             </a:fld>
             <a:endParaRPr lang="en-CA"/>
           </a:p>
@@ -1447,7 +1447,7 @@
             <a:fld id="{667A62CB-8588-4D98-8E9E-C665A03A0EA4}" type="datetimeFigureOut">
               <a:rPr lang="en-CA" smtClean="0"/>
               <a:pPr/>
-              <a:t>2024-06-06</a:t>
+              <a:t>2024-06-11</a:t>
             </a:fld>
             <a:endParaRPr lang="en-CA"/>
           </a:p>
@@ -1690,7 +1690,7 @@
             <a:fld id="{667A62CB-8588-4D98-8E9E-C665A03A0EA4}" type="datetimeFigureOut">
               <a:rPr lang="en-CA" smtClean="0"/>
               <a:pPr/>
-              <a:t>2024-06-06</a:t>
+              <a:t>2024-06-11</a:t>
             </a:fld>
             <a:endParaRPr lang="en-CA"/>
           </a:p>
@@ -1975,7 +1975,7 @@
             <a:fld id="{667A62CB-8588-4D98-8E9E-C665A03A0EA4}" type="datetimeFigureOut">
               <a:rPr lang="en-CA" smtClean="0"/>
               <a:pPr/>
-              <a:t>2024-06-06</a:t>
+              <a:t>2024-06-11</a:t>
             </a:fld>
             <a:endParaRPr lang="en-CA"/>
           </a:p>
@@ -2394,7 +2394,7 @@
             <a:fld id="{667A62CB-8588-4D98-8E9E-C665A03A0EA4}" type="datetimeFigureOut">
               <a:rPr lang="en-CA" smtClean="0"/>
               <a:pPr/>
-              <a:t>2024-06-06</a:t>
+              <a:t>2024-06-11</a:t>
             </a:fld>
             <a:endParaRPr lang="en-CA"/>
           </a:p>
@@ -2509,7 +2509,7 @@
             <a:fld id="{667A62CB-8588-4D98-8E9E-C665A03A0EA4}" type="datetimeFigureOut">
               <a:rPr lang="en-CA" smtClean="0"/>
               <a:pPr/>
-              <a:t>2024-06-06</a:t>
+              <a:t>2024-06-11</a:t>
             </a:fld>
             <a:endParaRPr lang="en-CA"/>
           </a:p>
@@ -2601,7 +2601,7 @@
             <a:fld id="{667A62CB-8588-4D98-8E9E-C665A03A0EA4}" type="datetimeFigureOut">
               <a:rPr lang="en-CA" smtClean="0"/>
               <a:pPr/>
-              <a:t>2024-06-06</a:t>
+              <a:t>2024-06-11</a:t>
             </a:fld>
             <a:endParaRPr lang="en-CA"/>
           </a:p>
@@ -2875,7 +2875,7 @@
             <a:fld id="{667A62CB-8588-4D98-8E9E-C665A03A0EA4}" type="datetimeFigureOut">
               <a:rPr lang="en-CA" smtClean="0"/>
               <a:pPr/>
-              <a:t>2024-06-06</a:t>
+              <a:t>2024-06-11</a:t>
             </a:fld>
             <a:endParaRPr lang="en-CA"/>
           </a:p>
@@ -3125,7 +3125,7 @@
             <a:fld id="{667A62CB-8588-4D98-8E9E-C665A03A0EA4}" type="datetimeFigureOut">
               <a:rPr lang="en-CA" smtClean="0"/>
               <a:pPr/>
-              <a:t>2024-06-06</a:t>
+              <a:t>2024-06-11</a:t>
             </a:fld>
             <a:endParaRPr lang="en-CA"/>
           </a:p>
@@ -3335,7 +3335,7 @@
             <a:fld id="{667A62CB-8588-4D98-8E9E-C665A03A0EA4}" type="datetimeFigureOut">
               <a:rPr lang="en-CA" smtClean="0"/>
               <a:pPr/>
-              <a:t>2024-06-06</a:t>
+              <a:t>2024-06-11</a:t>
             </a:fld>
             <a:endParaRPr lang="en-CA"/>
           </a:p>
@@ -7977,7 +7977,11 @@
           <a:p>
             <a:pPr algn="ctr"/>
             <a:r>
-              <a:rPr lang="en-CA" sz="2800" dirty="0"/>
+              <a:rPr lang="en-CA" sz="2800" dirty="0">
+                <a:solidFill>
+                  <a:schemeClr val="tx1"/>
+                </a:solidFill>
+              </a:rPr>
               <a:t>0,0</a:t>
             </a:r>
           </a:p>
@@ -8020,7 +8024,11 @@
           <a:p>
             <a:pPr algn="ctr"/>
             <a:r>
-              <a:rPr lang="en-CA" sz="2800" dirty="0"/>
+              <a:rPr lang="en-CA" sz="2800" dirty="0">
+                <a:solidFill>
+                  <a:schemeClr val="tx1"/>
+                </a:solidFill>
+              </a:rPr>
               <a:t>1,1</a:t>
             </a:r>
           </a:p>
@@ -8063,7 +8071,11 @@
           <a:p>
             <a:pPr algn="ctr"/>
             <a:r>
-              <a:rPr lang="en-CA" sz="2800" dirty="0"/>
+              <a:rPr lang="en-CA" sz="2800" dirty="0">
+                <a:solidFill>
+                  <a:schemeClr val="tx1"/>
+                </a:solidFill>
+              </a:rPr>
               <a:t>1,0</a:t>
             </a:r>
           </a:p>
@@ -8106,7 +8118,11 @@
           <a:p>
             <a:pPr algn="ctr"/>
             <a:r>
-              <a:rPr lang="en-CA" sz="2800" dirty="0"/>
+              <a:rPr lang="en-CA" sz="2800" dirty="0">
+                <a:solidFill>
+                  <a:schemeClr val="tx1"/>
+                </a:solidFill>
+              </a:rPr>
               <a:t>0,1</a:t>
             </a:r>
           </a:p>
@@ -8330,7 +8346,11 @@
           <a:p>
             <a:pPr algn="ctr"/>
             <a:r>
-              <a:rPr lang="en-CA" sz="2800" dirty="0"/>
+              <a:rPr lang="en-CA" sz="2800" dirty="0">
+                <a:solidFill>
+                  <a:schemeClr val="tx1"/>
+                </a:solidFill>
+              </a:rPr>
               <a:t>0,0</a:t>
             </a:r>
           </a:p>
@@ -8373,7 +8393,11 @@
           <a:p>
             <a:pPr algn="ctr"/>
             <a:r>
-              <a:rPr lang="en-CA" sz="2800" dirty="0"/>
+              <a:rPr lang="en-CA" sz="2800" dirty="0">
+                <a:solidFill>
+                  <a:schemeClr val="tx1"/>
+                </a:solidFill>
+              </a:rPr>
               <a:t>1,0</a:t>
             </a:r>
           </a:p>
@@ -8416,7 +8440,11 @@
           <a:p>
             <a:pPr algn="ctr"/>
             <a:r>
-              <a:rPr lang="en-CA" sz="2800" dirty="0"/>
+              <a:rPr lang="en-CA" sz="2800" dirty="0">
+                <a:solidFill>
+                  <a:schemeClr val="tx1"/>
+                </a:solidFill>
+              </a:rPr>
               <a:t>1, 1</a:t>
             </a:r>
           </a:p>
@@ -8459,7 +8487,11 @@
           <a:p>
             <a:pPr algn="ctr"/>
             <a:r>
-              <a:rPr lang="en-CA" sz="2800" dirty="0"/>
+              <a:rPr lang="en-CA" sz="2800" dirty="0">
+                <a:solidFill>
+                  <a:schemeClr val="tx1"/>
+                </a:solidFill>
+              </a:rPr>
               <a:t>0,1</a:t>
             </a:r>
           </a:p>
@@ -9364,7 +9396,10 @@
           <a:lstStyle/>
           <a:p>
             <a:pPr algn="ctr"/>
-            <a:endParaRPr lang="en-CA"/>
+            <a:r>
+              <a:rPr lang="en-CA" dirty="0"/>
+              <a:t>Loader</a:t>
+            </a:r>
           </a:p>
         </p:txBody>
       </p:sp>
@@ -9376,7 +9411,7 @@
         </p:nvSpPr>
         <p:spPr>
           <a:xfrm>
-            <a:off x="4724400" y="590550"/>
+            <a:off x="5649043" y="587829"/>
             <a:ext cx="1447800" cy="1524000"/>
           </a:xfrm>
           <a:prstGeom prst="rect">
@@ -9426,7 +9461,7 @@
         <p:spPr>
           <a:xfrm>
             <a:off x="3962400" y="1276350"/>
-            <a:ext cx="685800" cy="381000"/>
+            <a:ext cx="1645822" cy="381000"/>
           </a:xfrm>
           <a:prstGeom prst="rightArrow">
             <a:avLst/>
@@ -9453,7 +9488,10 @@
           <a:lstStyle/>
           <a:p>
             <a:pPr algn="ctr"/>
-            <a:endParaRPr lang="en-CA"/>
+            <a:r>
+              <a:rPr lang="en-CA" dirty="0"/>
+              <a:t>Convert</a:t>
+            </a:r>
           </a:p>
         </p:txBody>
       </p:sp>
@@ -10504,7 +10542,7 @@
         </p:nvSpPr>
         <p:spPr>
           <a:xfrm>
-            <a:off x="3232744" y="1390650"/>
+            <a:off x="3202808" y="1390650"/>
             <a:ext cx="2133600" cy="381000"/>
           </a:xfrm>
           <a:prstGeom prst="roundRect">
@@ -10534,7 +10572,7 @@
             <a:pPr algn="ctr"/>
             <a:r>
               <a:rPr lang="en-CA" dirty="0"/>
-              <a:t>Texture “Units” 1</a:t>
+              <a:t>Texture “Units” 21</a:t>
             </a:r>
           </a:p>
         </p:txBody>
@@ -10630,15 +10668,15 @@
           <p:cNvPr id="20" name="Straight Arrow Connector 19"/>
           <p:cNvCxnSpPr>
             <a:cxnSpLocks/>
-            <a:stCxn id="10" idx="3"/>
+            <a:stCxn id="17" idx="3"/>
             <a:endCxn id="7" idx="1"/>
           </p:cNvCxnSpPr>
           <p:nvPr/>
         </p:nvCxnSpPr>
         <p:spPr>
-          <a:xfrm>
-            <a:off x="5334000" y="1009650"/>
-            <a:ext cx="1156607" cy="342900"/>
+          <a:xfrm flipV="1">
+            <a:off x="5334000" y="1352550"/>
+            <a:ext cx="1156607" cy="1409837"/>
           </a:xfrm>
           <a:prstGeom prst="straightConnector1">
             <a:avLst/>
@@ -10672,15 +10710,15 @@
           <p:cNvPr id="31" name="Straight Arrow Connector 30"/>
           <p:cNvCxnSpPr>
             <a:cxnSpLocks/>
-            <a:stCxn id="10" idx="1"/>
-            <a:endCxn id="5" idx="3"/>
+            <a:stCxn id="17" idx="1"/>
+            <a:endCxn id="4" idx="3"/>
           </p:cNvCxnSpPr>
           <p:nvPr/>
         </p:nvCxnSpPr>
         <p:spPr>
-          <a:xfrm flipH="1">
-            <a:off x="2289837" y="1009650"/>
-            <a:ext cx="910563" cy="1943100"/>
+          <a:xfrm flipH="1" flipV="1">
+            <a:off x="2310649" y="1238250"/>
+            <a:ext cx="889751" cy="1524137"/>
           </a:xfrm>
           <a:prstGeom prst="straightConnector1">
             <a:avLst/>
@@ -10850,14 +10888,14 @@
           <p:cNvCxnSpPr>
             <a:cxnSpLocks/>
             <a:stCxn id="9" idx="1"/>
-            <a:endCxn id="17" idx="3"/>
+            <a:endCxn id="16" idx="3"/>
           </p:cNvCxnSpPr>
           <p:nvPr/>
         </p:nvCxnSpPr>
         <p:spPr>
           <a:xfrm flipH="1" flipV="1">
-            <a:off x="5334000" y="2762387"/>
-            <a:ext cx="1143000" cy="69850"/>
+            <a:off x="5334000" y="2190750"/>
+            <a:ext cx="1143000" cy="641487"/>
           </a:xfrm>
           <a:prstGeom prst="straightConnector1">
             <a:avLst/>

</xml_diff>

<commit_message>
end of class Thursday
</commit_message>
<xml_diff>
--- a/Lectures/Day_11 Texturing, part 1/INFO3111_Texture_mapping (code on last slide).pptx
+++ b/Lectures/Day_11 Texturing, part 1/INFO3111_Texture_mapping (code on last slide).pptx
@@ -228,7 +228,7 @@
             <a:fld id="{6E28E25E-87BB-46EA-8F9E-473DAE89420C}" type="datetimeFigureOut">
               <a:rPr lang="en-CA" smtClean="0"/>
               <a:pPr/>
-              <a:t>2024-06-11</a:t>
+              <a:t>2024-06-13</a:t>
             </a:fld>
             <a:endParaRPr lang="en-CA"/>
           </a:p>
@@ -394,7 +394,7 @@
           <a:p>
             <a:fld id="{D61BC0C6-8165-4029-93EB-E0CF8A3883CE}" type="datetimeFigureOut">
               <a:rPr lang="en-CA" smtClean="0"/>
-              <a:t>2024-06-11</a:t>
+              <a:t>2024-06-13</a:t>
             </a:fld>
             <a:endParaRPr lang="en-CA"/>
           </a:p>
@@ -936,7 +936,7 @@
             <a:fld id="{667A62CB-8588-4D98-8E9E-C665A03A0EA4}" type="datetimeFigureOut">
               <a:rPr lang="en-CA" smtClean="0"/>
               <a:pPr/>
-              <a:t>2024-06-11</a:t>
+              <a:t>2024-06-13</a:t>
             </a:fld>
             <a:endParaRPr lang="en-CA"/>
           </a:p>
@@ -1103,7 +1103,7 @@
             <a:fld id="{667A62CB-8588-4D98-8E9E-C665A03A0EA4}" type="datetimeFigureOut">
               <a:rPr lang="en-CA" smtClean="0"/>
               <a:pPr/>
-              <a:t>2024-06-11</a:t>
+              <a:t>2024-06-13</a:t>
             </a:fld>
             <a:endParaRPr lang="en-CA"/>
           </a:p>
@@ -1280,7 +1280,7 @@
             <a:fld id="{667A62CB-8588-4D98-8E9E-C665A03A0EA4}" type="datetimeFigureOut">
               <a:rPr lang="en-CA" smtClean="0"/>
               <a:pPr/>
-              <a:t>2024-06-11</a:t>
+              <a:t>2024-06-13</a:t>
             </a:fld>
             <a:endParaRPr lang="en-CA"/>
           </a:p>
@@ -1447,7 +1447,7 @@
             <a:fld id="{667A62CB-8588-4D98-8E9E-C665A03A0EA4}" type="datetimeFigureOut">
               <a:rPr lang="en-CA" smtClean="0"/>
               <a:pPr/>
-              <a:t>2024-06-11</a:t>
+              <a:t>2024-06-13</a:t>
             </a:fld>
             <a:endParaRPr lang="en-CA"/>
           </a:p>
@@ -1690,7 +1690,7 @@
             <a:fld id="{667A62CB-8588-4D98-8E9E-C665A03A0EA4}" type="datetimeFigureOut">
               <a:rPr lang="en-CA" smtClean="0"/>
               <a:pPr/>
-              <a:t>2024-06-11</a:t>
+              <a:t>2024-06-13</a:t>
             </a:fld>
             <a:endParaRPr lang="en-CA"/>
           </a:p>
@@ -1975,7 +1975,7 @@
             <a:fld id="{667A62CB-8588-4D98-8E9E-C665A03A0EA4}" type="datetimeFigureOut">
               <a:rPr lang="en-CA" smtClean="0"/>
               <a:pPr/>
-              <a:t>2024-06-11</a:t>
+              <a:t>2024-06-13</a:t>
             </a:fld>
             <a:endParaRPr lang="en-CA"/>
           </a:p>
@@ -2394,7 +2394,7 @@
             <a:fld id="{667A62CB-8588-4D98-8E9E-C665A03A0EA4}" type="datetimeFigureOut">
               <a:rPr lang="en-CA" smtClean="0"/>
               <a:pPr/>
-              <a:t>2024-06-11</a:t>
+              <a:t>2024-06-13</a:t>
             </a:fld>
             <a:endParaRPr lang="en-CA"/>
           </a:p>
@@ -2509,7 +2509,7 @@
             <a:fld id="{667A62CB-8588-4D98-8E9E-C665A03A0EA4}" type="datetimeFigureOut">
               <a:rPr lang="en-CA" smtClean="0"/>
               <a:pPr/>
-              <a:t>2024-06-11</a:t>
+              <a:t>2024-06-13</a:t>
             </a:fld>
             <a:endParaRPr lang="en-CA"/>
           </a:p>
@@ -2601,7 +2601,7 @@
             <a:fld id="{667A62CB-8588-4D98-8E9E-C665A03A0EA4}" type="datetimeFigureOut">
               <a:rPr lang="en-CA" smtClean="0"/>
               <a:pPr/>
-              <a:t>2024-06-11</a:t>
+              <a:t>2024-06-13</a:t>
             </a:fld>
             <a:endParaRPr lang="en-CA"/>
           </a:p>
@@ -2875,7 +2875,7 @@
             <a:fld id="{667A62CB-8588-4D98-8E9E-C665A03A0EA4}" type="datetimeFigureOut">
               <a:rPr lang="en-CA" smtClean="0"/>
               <a:pPr/>
-              <a:t>2024-06-11</a:t>
+              <a:t>2024-06-13</a:t>
             </a:fld>
             <a:endParaRPr lang="en-CA"/>
           </a:p>
@@ -3125,7 +3125,7 @@
             <a:fld id="{667A62CB-8588-4D98-8E9E-C665A03A0EA4}" type="datetimeFigureOut">
               <a:rPr lang="en-CA" smtClean="0"/>
               <a:pPr/>
-              <a:t>2024-06-11</a:t>
+              <a:t>2024-06-13</a:t>
             </a:fld>
             <a:endParaRPr lang="en-CA"/>
           </a:p>
@@ -3335,7 +3335,7 @@
             <a:fld id="{667A62CB-8588-4D98-8E9E-C665A03A0EA4}" type="datetimeFigureOut">
               <a:rPr lang="en-CA" smtClean="0"/>
               <a:pPr/>
-              <a:t>2024-06-11</a:t>
+              <a:t>2024-06-13</a:t>
             </a:fld>
             <a:endParaRPr lang="en-CA"/>
           </a:p>
@@ -10246,14 +10246,14 @@
             </a:r>
             <a:r>
               <a:rPr lang="en-CA" dirty="0"/>
-              <a:t> RAM 17</a:t>
+              <a:t> RAM 4</a:t>
             </a:r>
           </a:p>
           <a:p>
             <a:pPr algn="ctr"/>
             <a:r>
               <a:rPr lang="en-CA" dirty="0"/>
-              <a:t>(water)</a:t>
+              <a:t>(sloth)</a:t>
             </a:r>
           </a:p>
         </p:txBody>
@@ -10669,14 +10669,13 @@
           <p:cNvCxnSpPr>
             <a:cxnSpLocks/>
             <a:stCxn id="17" idx="3"/>
-            <a:endCxn id="7" idx="1"/>
           </p:cNvCxnSpPr>
           <p:nvPr/>
         </p:nvCxnSpPr>
         <p:spPr>
           <a:xfrm flipV="1">
-            <a:off x="5334000" y="1352550"/>
-            <a:ext cx="1156607" cy="1409837"/>
+            <a:off x="5334000" y="2190750"/>
+            <a:ext cx="1215363" cy="571637"/>
           </a:xfrm>
           <a:prstGeom prst="straightConnector1">
             <a:avLst/>
@@ -10711,14 +10710,14 @@
           <p:cNvCxnSpPr>
             <a:cxnSpLocks/>
             <a:stCxn id="17" idx="1"/>
-            <a:endCxn id="4" idx="3"/>
+            <a:endCxn id="5" idx="3"/>
           </p:cNvCxnSpPr>
           <p:nvPr/>
         </p:nvCxnSpPr>
         <p:spPr>
-          <a:xfrm flipH="1" flipV="1">
-            <a:off x="2310649" y="1238250"/>
-            <a:ext cx="889751" cy="1524137"/>
+          <a:xfrm flipH="1">
+            <a:off x="2289837" y="2762387"/>
+            <a:ext cx="910563" cy="190363"/>
           </a:xfrm>
           <a:prstGeom prst="straightConnector1">
             <a:avLst/>

</xml_diff>